<commit_message>
edit pigeonhole magictrickII partial-fractions.pptx; dashes in counting chap
</commit_message>
<xml_diff>
--- a/spring13/slides13/magictrickII.pptx
+++ b/spring13/slides13/magictrickII.pptx
@@ -4282,7 +4282,7 @@
           <a:graphicData uri="http://schemas.openxmlformats.org/presentationml/2006/ole">
             <mc:AlternateContent xmlns:mc="http://schemas.openxmlformats.org/markup-compatibility/2006">
               <mc:Choice xmlns:v="urn:schemas-microsoft-com:vml" Requires="v">
-                <p:oleObj spid="_x0000_s153633" name="Equation" r:id="rId9" imgW="508000" imgH="406400" progId="Equation.DSMT4">
+                <p:oleObj spid="_x0000_s153635" name="Equation" r:id="rId9" imgW="508000" imgH="406400" progId="Equation.DSMT4">
                   <p:embed/>
                 </p:oleObj>
               </mc:Choice>
@@ -5143,7 +5143,7 @@
           <a:graphicData uri="http://schemas.openxmlformats.org/presentationml/2006/ole">
             <mc:AlternateContent xmlns:mc="http://schemas.openxmlformats.org/markup-compatibility/2006">
               <mc:Choice xmlns:v="urn:schemas-microsoft-com:vml" Requires="v">
-                <p:oleObj spid="_x0000_s155701" name="Equation" r:id="rId4" imgW="1002960" imgH="406080" progId="Equation.DSMT4">
+                <p:oleObj spid="_x0000_s155704" name="Equation" r:id="rId4" imgW="1002960" imgH="406080" progId="Equation.DSMT4">
                   <p:embed/>
                 </p:oleObj>
               </mc:Choice>
@@ -5275,7 +5275,7 @@
           <a:graphicData uri="http://schemas.openxmlformats.org/presentationml/2006/ole">
             <mc:AlternateContent xmlns:mc="http://schemas.openxmlformats.org/markup-compatibility/2006">
               <mc:Choice xmlns:v="urn:schemas-microsoft-com:vml" Requires="v">
-                <p:oleObj spid="_x0000_s155702" name="Equation" r:id="rId6" imgW="1104840" imgH="457200" progId="Equation.DSMT4">
+                <p:oleObj spid="_x0000_s155705" name="Equation" r:id="rId6" imgW="1104840" imgH="457200" progId="Equation.DSMT4">
                   <p:embed/>
                 </p:oleObj>
               </mc:Choice>
@@ -6190,7 +6190,7 @@
           <a:graphicData uri="http://schemas.openxmlformats.org/presentationml/2006/ole">
             <mc:AlternateContent xmlns:mc="http://schemas.openxmlformats.org/markup-compatibility/2006">
               <mc:Choice xmlns:v="urn:schemas-microsoft-com:vml" Requires="v">
-                <p:oleObj spid="_x0000_s157729" name="Equation" r:id="rId4" imgW="1028700" imgH="482600" progId="Equation.DSMT4">
+                <p:oleObj spid="_x0000_s157731" name="Equation" r:id="rId4" imgW="1028700" imgH="482600" progId="Equation.DSMT4">
                   <p:embed/>
                 </p:oleObj>
               </mc:Choice>
@@ -6684,8 +6684,8 @@
         </p:nvSpPr>
         <p:spPr>
           <a:xfrm>
-            <a:off x="469900" y="1371600"/>
-            <a:ext cx="8216900" cy="3124200"/>
+            <a:off x="304800" y="1371600"/>
+            <a:ext cx="8534400" cy="3276600"/>
           </a:xfrm>
         </p:spPr>
         <p:txBody>
@@ -6774,7 +6774,14 @@
                 <a:latin typeface="Comic Sans MS" pitchFamily="66" charset="0"/>
                 <a:cs typeface="Times New Roman" pitchFamily="8" charset="0"/>
               </a:rPr>
-              <a:t> lists one of them </a:t>
+              <a:t> </a:t>
+            </a:r>
+            <a:r>
+              <a:rPr lang="en-US" sz="4000" dirty="0" smtClean="0">
+                <a:latin typeface="Comic Sans MS" pitchFamily="66" charset="0"/>
+                <a:cs typeface="Times New Roman" pitchFamily="8" charset="0"/>
+              </a:rPr>
+              <a:t>hides one, lists the other one </a:t>
             </a:r>
             <a:r>
               <a:rPr lang="en-US" sz="4000" dirty="0" smtClean="0">

</xml_diff>